<commit_message>
Layout: compacta noticias (tipografía y espaciado)
</commit_message>
<xml_diff>
--- a/rediseño layout.pptx
+++ b/rediseño layout.pptx
@@ -6,7 +6,8 @@
   </p:sldMasterIdLst>
   <p:sldIdLst>
     <p:sldId id="256" r:id="rId2"/>
-    <p:sldId id="257" r:id="rId3"/>
+    <p:sldId id="258" r:id="rId3"/>
+    <p:sldId id="257" r:id="rId4"/>
   </p:sldIdLst>
   <p:sldSz cx="12192000" cy="6858000"/>
   <p:notesSz cx="6858000" cy="9144000"/>
@@ -106,6 +107,179 @@
     </a:lvl9pPr>
   </p:defaultTextStyle>
 </p:presentation>
+</file>
+
+<file path=ppt/revisionInfo.xml><?xml version="1.0" encoding="utf-8"?>
+<p1510:revInfo xmlns:a="http://schemas.openxmlformats.org/drawingml/2006/main" xmlns:r="http://schemas.openxmlformats.org/officeDocument/2006/relationships" xmlns:p1510="http://schemas.microsoft.com/office/powerpoint/2015/10/main">
+  <p1510:revLst>
+    <p1510:client id="{2799722A-FA85-4591-9325-11E350A8B82A}" v="3" dt="2026-02-20T08:16:32.488"/>
+  </p1510:revLst>
+</p1510:revInfo>
+</file>
+
+<file path=ppt/changesInfos/changesInfo1.xml><?xml version="1.0" encoding="utf-8"?>
+<pc:chgInfo xmlns:a="http://schemas.openxmlformats.org/drawingml/2006/main" xmlns:r="http://schemas.openxmlformats.org/officeDocument/2006/relationships" xmlns:ac="http://schemas.microsoft.com/office/drawing/2013/main/command" xmlns:pc="http://schemas.microsoft.com/office/powerpoint/2013/main/command">
+  <pc:docChgLst>
+    <pc:chgData name="Luis Guinea" userId="f040cd607ac8806d" providerId="LiveId" clId="{89890A16-D95C-48D1-8D5A-F39C0C2B1E7F}"/>
+    <pc:docChg chg="custSel addSld modSld">
+      <pc:chgData name="Luis Guinea" userId="f040cd607ac8806d" providerId="LiveId" clId="{89890A16-D95C-48D1-8D5A-F39C0C2B1E7F}" dt="2026-02-20T08:16:53.859" v="27" actId="14100"/>
+      <pc:docMkLst>
+        <pc:docMk/>
+      </pc:docMkLst>
+      <pc:sldChg chg="addSp delSp modSp add mod">
+        <pc:chgData name="Luis Guinea" userId="f040cd607ac8806d" providerId="LiveId" clId="{89890A16-D95C-48D1-8D5A-F39C0C2B1E7F}" dt="2026-02-20T08:16:53.859" v="27" actId="14100"/>
+        <pc:sldMkLst>
+          <pc:docMk/>
+          <pc:sldMk cId="1349964298" sldId="258"/>
+        </pc:sldMkLst>
+        <pc:spChg chg="del">
+          <ac:chgData name="Luis Guinea" userId="f040cd607ac8806d" providerId="LiveId" clId="{89890A16-D95C-48D1-8D5A-F39C0C2B1E7F}" dt="2026-02-20T08:14:57.310" v="4" actId="478"/>
+          <ac:spMkLst>
+            <pc:docMk/>
+            <pc:sldMk cId="1349964298" sldId="258"/>
+            <ac:spMk id="23" creationId="{F6CF6296-3B80-AE6A-5048-9968A1AA3486}"/>
+          </ac:spMkLst>
+        </pc:spChg>
+        <pc:spChg chg="del">
+          <ac:chgData name="Luis Guinea" userId="f040cd607ac8806d" providerId="LiveId" clId="{89890A16-D95C-48D1-8D5A-F39C0C2B1E7F}" dt="2026-02-20T08:14:57.310" v="4" actId="478"/>
+          <ac:spMkLst>
+            <pc:docMk/>
+            <pc:sldMk cId="1349964298" sldId="258"/>
+            <ac:spMk id="24" creationId="{27196EDD-7914-7DAB-DF9B-02A7F43E62E8}"/>
+          </ac:spMkLst>
+        </pc:spChg>
+        <pc:spChg chg="del">
+          <ac:chgData name="Luis Guinea" userId="f040cd607ac8806d" providerId="LiveId" clId="{89890A16-D95C-48D1-8D5A-F39C0C2B1E7F}" dt="2026-02-20T08:14:57.310" v="4" actId="478"/>
+          <ac:spMkLst>
+            <pc:docMk/>
+            <pc:sldMk cId="1349964298" sldId="258"/>
+            <ac:spMk id="25" creationId="{56100BCA-9B1D-7F1C-0124-CBB845E46B0D}"/>
+          </ac:spMkLst>
+        </pc:spChg>
+        <pc:spChg chg="del">
+          <ac:chgData name="Luis Guinea" userId="f040cd607ac8806d" providerId="LiveId" clId="{89890A16-D95C-48D1-8D5A-F39C0C2B1E7F}" dt="2026-02-20T08:14:57.310" v="4" actId="478"/>
+          <ac:spMkLst>
+            <pc:docMk/>
+            <pc:sldMk cId="1349964298" sldId="258"/>
+            <ac:spMk id="26" creationId="{A6F1C444-0607-573C-0C3C-C922578CC17D}"/>
+          </ac:spMkLst>
+        </pc:spChg>
+        <pc:spChg chg="del">
+          <ac:chgData name="Luis Guinea" userId="f040cd607ac8806d" providerId="LiveId" clId="{89890A16-D95C-48D1-8D5A-F39C0C2B1E7F}" dt="2026-02-20T08:14:57.310" v="4" actId="478"/>
+          <ac:spMkLst>
+            <pc:docMk/>
+            <pc:sldMk cId="1349964298" sldId="258"/>
+            <ac:spMk id="27" creationId="{1AFA83B1-7966-35B3-467A-0865DFDC3D1C}"/>
+          </ac:spMkLst>
+        </pc:spChg>
+        <pc:spChg chg="del">
+          <ac:chgData name="Luis Guinea" userId="f040cd607ac8806d" providerId="LiveId" clId="{89890A16-D95C-48D1-8D5A-F39C0C2B1E7F}" dt="2026-02-20T08:14:57.310" v="4" actId="478"/>
+          <ac:spMkLst>
+            <pc:docMk/>
+            <pc:sldMk cId="1349964298" sldId="258"/>
+            <ac:spMk id="28" creationId="{B5DE2CE0-0DD3-352E-95A3-AC985346CF76}"/>
+          </ac:spMkLst>
+        </pc:spChg>
+        <pc:picChg chg="add mod">
+          <ac:chgData name="Luis Guinea" userId="f040cd607ac8806d" providerId="LiveId" clId="{89890A16-D95C-48D1-8D5A-F39C0C2B1E7F}" dt="2026-02-20T08:15:19.564" v="12" actId="1076"/>
+          <ac:picMkLst>
+            <pc:docMk/>
+            <pc:sldMk cId="1349964298" sldId="258"/>
+            <ac:picMk id="2" creationId="{0FE52ED2-F274-0FEB-0B59-2370B709EC76}"/>
+          </ac:picMkLst>
+        </pc:picChg>
+        <pc:picChg chg="add mod modCrop">
+          <ac:chgData name="Luis Guinea" userId="f040cd607ac8806d" providerId="LiveId" clId="{89890A16-D95C-48D1-8D5A-F39C0C2B1E7F}" dt="2026-02-20T08:16:15.430" v="22" actId="14100"/>
+          <ac:picMkLst>
+            <pc:docMk/>
+            <pc:sldMk cId="1349964298" sldId="258"/>
+            <ac:picMk id="3" creationId="{E42A9AD9-BC87-8028-757D-3EFD1290235C}"/>
+          </ac:picMkLst>
+        </pc:picChg>
+        <pc:picChg chg="add mod modCrop">
+          <ac:chgData name="Luis Guinea" userId="f040cd607ac8806d" providerId="LiveId" clId="{89890A16-D95C-48D1-8D5A-F39C0C2B1E7F}" dt="2026-02-20T08:16:53.859" v="27" actId="14100"/>
+          <ac:picMkLst>
+            <pc:docMk/>
+            <pc:sldMk cId="1349964298" sldId="258"/>
+            <ac:picMk id="4" creationId="{48FD93C8-6D04-E57D-9D4D-86D008B7AE09}"/>
+          </ac:picMkLst>
+        </pc:picChg>
+        <pc:picChg chg="mod">
+          <ac:chgData name="Luis Guinea" userId="f040cd607ac8806d" providerId="LiveId" clId="{89890A16-D95C-48D1-8D5A-F39C0C2B1E7F}" dt="2026-02-20T08:15:12.370" v="9" actId="14100"/>
+          <ac:picMkLst>
+            <pc:docMk/>
+            <pc:sldMk cId="1349964298" sldId="258"/>
+            <ac:picMk id="15" creationId="{373316E8-C44B-636A-2D94-557D67C425D2}"/>
+          </ac:picMkLst>
+        </pc:picChg>
+        <pc:picChg chg="del">
+          <ac:chgData name="Luis Guinea" userId="f040cd607ac8806d" providerId="LiveId" clId="{89890A16-D95C-48D1-8D5A-F39C0C2B1E7F}" dt="2026-02-20T08:14:36.485" v="1" actId="478"/>
+          <ac:picMkLst>
+            <pc:docMk/>
+            <pc:sldMk cId="1349964298" sldId="258"/>
+            <ac:picMk id="19" creationId="{2542011C-AB17-0211-133B-B86D10AB4A47}"/>
+          </ac:picMkLst>
+        </pc:picChg>
+        <pc:picChg chg="del">
+          <ac:chgData name="Luis Guinea" userId="f040cd607ac8806d" providerId="LiveId" clId="{89890A16-D95C-48D1-8D5A-F39C0C2B1E7F}" dt="2026-02-20T08:14:38.890" v="2" actId="478"/>
+          <ac:picMkLst>
+            <pc:docMk/>
+            <pc:sldMk cId="1349964298" sldId="258"/>
+            <ac:picMk id="20" creationId="{AB62137B-908E-83FE-FB09-4B46040AC7E7}"/>
+          </ac:picMkLst>
+        </pc:picChg>
+        <pc:picChg chg="del">
+          <ac:chgData name="Luis Guinea" userId="f040cd607ac8806d" providerId="LiveId" clId="{89890A16-D95C-48D1-8D5A-F39C0C2B1E7F}" dt="2026-02-20T08:15:02.688" v="6" actId="478"/>
+          <ac:picMkLst>
+            <pc:docMk/>
+            <pc:sldMk cId="1349964298" sldId="258"/>
+            <ac:picMk id="21" creationId="{1027734A-29D6-E315-8BA4-02FE2A0B0BE2}"/>
+          </ac:picMkLst>
+        </pc:picChg>
+        <pc:picChg chg="del">
+          <ac:chgData name="Luis Guinea" userId="f040cd607ac8806d" providerId="LiveId" clId="{89890A16-D95C-48D1-8D5A-F39C0C2B1E7F}" dt="2026-02-20T08:15:00.054" v="5" actId="478"/>
+          <ac:picMkLst>
+            <pc:docMk/>
+            <pc:sldMk cId="1349964298" sldId="258"/>
+            <ac:picMk id="22" creationId="{07791508-CA4A-79E8-4607-850B8DE120C1}"/>
+          </ac:picMkLst>
+        </pc:picChg>
+        <pc:picChg chg="del">
+          <ac:chgData name="Luis Guinea" userId="f040cd607ac8806d" providerId="LiveId" clId="{89890A16-D95C-48D1-8D5A-F39C0C2B1E7F}" dt="2026-02-20T08:14:57.310" v="4" actId="478"/>
+          <ac:picMkLst>
+            <pc:docMk/>
+            <pc:sldMk cId="1349964298" sldId="258"/>
+            <ac:picMk id="30" creationId="{B4800B9A-ABDF-E4D9-1EE9-8E05E08377F4}"/>
+          </ac:picMkLst>
+        </pc:picChg>
+        <pc:picChg chg="del">
+          <ac:chgData name="Luis Guinea" userId="f040cd607ac8806d" providerId="LiveId" clId="{89890A16-D95C-48D1-8D5A-F39C0C2B1E7F}" dt="2026-02-20T08:14:57.310" v="4" actId="478"/>
+          <ac:picMkLst>
+            <pc:docMk/>
+            <pc:sldMk cId="1349964298" sldId="258"/>
+            <ac:picMk id="32" creationId="{F8DFE962-9E3A-F1FD-6FD0-5D6A578E0031}"/>
+          </ac:picMkLst>
+        </pc:picChg>
+        <pc:picChg chg="del">
+          <ac:chgData name="Luis Guinea" userId="f040cd607ac8806d" providerId="LiveId" clId="{89890A16-D95C-48D1-8D5A-F39C0C2B1E7F}" dt="2026-02-20T08:14:57.310" v="4" actId="478"/>
+          <ac:picMkLst>
+            <pc:docMk/>
+            <pc:sldMk cId="1349964298" sldId="258"/>
+            <ac:picMk id="34" creationId="{05F6ED65-8ABE-76AB-29F8-93B766F4634B}"/>
+          </ac:picMkLst>
+        </pc:picChg>
+        <pc:picChg chg="del">
+          <ac:chgData name="Luis Guinea" userId="f040cd607ac8806d" providerId="LiveId" clId="{89890A16-D95C-48D1-8D5A-F39C0C2B1E7F}" dt="2026-02-20T08:14:49.823" v="3" actId="478"/>
+          <ac:picMkLst>
+            <pc:docMk/>
+            <pc:sldMk cId="1349964298" sldId="258"/>
+            <ac:picMk id="36" creationId="{B4D67155-ABAB-0351-352F-C2033E510EE0}"/>
+          </ac:picMkLst>
+        </pc:picChg>
+      </pc:sldChg>
+    </pc:docChg>
+  </pc:docChgLst>
+</pc:chgInfo>
 </file>
 
 <file path=ppt/slideLayouts/slideLayout1.xml><?xml version="1.0" encoding="utf-8"?>
@@ -4372,6 +4546,213 @@
 </file>
 
 <file path=ppt/slides/slide2.xml><?xml version="1.0" encoding="utf-8"?>
+<p:sld xmlns:a="http://schemas.openxmlformats.org/drawingml/2006/main" xmlns:r="http://schemas.openxmlformats.org/officeDocument/2006/relationships" xmlns:p="http://schemas.openxmlformats.org/presentationml/2006/main">
+  <p:cSld>
+    <p:spTree>
+      <p:nvGrpSpPr>
+        <p:cNvPr id="1" name="">
+          <a:extLst>
+            <a:ext uri="{FF2B5EF4-FFF2-40B4-BE49-F238E27FC236}">
+              <a16:creationId xmlns:a16="http://schemas.microsoft.com/office/drawing/2014/main" id="{9BBE7941-79D4-DDC0-23E8-3F14DC3859F0}"/>
+            </a:ext>
+          </a:extLst>
+        </p:cNvPr>
+        <p:cNvGrpSpPr/>
+        <p:nvPr/>
+      </p:nvGrpSpPr>
+      <p:grpSpPr>
+        <a:xfrm>
+          <a:off x="0" y="0"/>
+          <a:ext cx="0" cy="0"/>
+          <a:chOff x="0" y="0"/>
+          <a:chExt cx="0" cy="0"/>
+        </a:xfrm>
+      </p:grpSpPr>
+      <p:pic>
+        <p:nvPicPr>
+          <p:cNvPr id="15" name="Imagen 14" descr="Interfaz de usuario gráfica, Sitio web&#10;&#10;El contenido generado por IA puede ser incorrecto.">
+            <a:extLst>
+              <a:ext uri="{FF2B5EF4-FFF2-40B4-BE49-F238E27FC236}">
+                <a16:creationId xmlns:a16="http://schemas.microsoft.com/office/drawing/2014/main" id="{373316E8-C44B-636A-2D94-557D67C425D2}"/>
+              </a:ext>
+            </a:extLst>
+          </p:cNvPr>
+          <p:cNvPicPr>
+            <a:picLocks noChangeAspect="1"/>
+          </p:cNvPicPr>
+          <p:nvPr/>
+        </p:nvPicPr>
+        <p:blipFill>
+          <a:blip r:embed="rId2"/>
+          <a:stretch>
+            <a:fillRect/>
+          </a:stretch>
+        </p:blipFill>
+        <p:spPr>
+          <a:xfrm>
+            <a:off x="66792" y="410536"/>
+            <a:ext cx="5106831" cy="4265159"/>
+          </a:xfrm>
+          <a:prstGeom prst="rect">
+            <a:avLst/>
+          </a:prstGeom>
+        </p:spPr>
+      </p:pic>
+      <p:sp>
+        <p:nvSpPr>
+          <p:cNvPr id="35" name="Flecha: a la derecha 34">
+            <a:extLst>
+              <a:ext uri="{FF2B5EF4-FFF2-40B4-BE49-F238E27FC236}">
+                <a16:creationId xmlns:a16="http://schemas.microsoft.com/office/drawing/2014/main" id="{FEDBE0F7-E712-5C3D-FDE5-5EFA9770E364}"/>
+              </a:ext>
+            </a:extLst>
+          </p:cNvPr>
+          <p:cNvSpPr/>
+          <p:nvPr/>
+        </p:nvSpPr>
+        <p:spPr>
+          <a:xfrm>
+            <a:off x="5552332" y="3516062"/>
+            <a:ext cx="699097" cy="342608"/>
+          </a:xfrm>
+          <a:prstGeom prst="rightArrow">
+            <a:avLst/>
+          </a:prstGeom>
+          <a:solidFill>
+            <a:srgbClr val="FF0000"/>
+          </a:solidFill>
+        </p:spPr>
+        <p:style>
+          <a:lnRef idx="2">
+            <a:schemeClr val="accent1">
+              <a:shade val="15000"/>
+            </a:schemeClr>
+          </a:lnRef>
+          <a:fillRef idx="1">
+            <a:schemeClr val="accent1"/>
+          </a:fillRef>
+          <a:effectRef idx="0">
+            <a:schemeClr val="accent1"/>
+          </a:effectRef>
+          <a:fontRef idx="minor">
+            <a:schemeClr val="lt1"/>
+          </a:fontRef>
+        </p:style>
+        <p:txBody>
+          <a:bodyPr rtlCol="0" anchor="ctr"/>
+          <a:lstStyle/>
+          <a:p>
+            <a:pPr algn="ctr"/>
+            <a:endParaRPr lang="es-ES"/>
+          </a:p>
+        </p:txBody>
+      </p:sp>
+      <p:pic>
+        <p:nvPicPr>
+          <p:cNvPr id="2" name="Imagen 1" descr="Interfaz de usuario gráfica, Sitio web&#10;&#10;El contenido generado por IA puede ser incorrecto.">
+            <a:extLst>
+              <a:ext uri="{FF2B5EF4-FFF2-40B4-BE49-F238E27FC236}">
+                <a16:creationId xmlns:a16="http://schemas.microsoft.com/office/drawing/2014/main" id="{0FE52ED2-F274-0FEB-0B59-2370B709EC76}"/>
+              </a:ext>
+            </a:extLst>
+          </p:cNvPr>
+          <p:cNvPicPr>
+            <a:picLocks noChangeAspect="1"/>
+          </p:cNvPicPr>
+          <p:nvPr/>
+        </p:nvPicPr>
+        <p:blipFill>
+          <a:blip r:embed="rId2"/>
+          <a:stretch>
+            <a:fillRect/>
+          </a:stretch>
+        </p:blipFill>
+        <p:spPr>
+          <a:xfrm>
+            <a:off x="6438450" y="410536"/>
+            <a:ext cx="5106832" cy="4265160"/>
+          </a:xfrm>
+          <a:prstGeom prst="rect">
+            <a:avLst/>
+          </a:prstGeom>
+        </p:spPr>
+      </p:pic>
+      <p:pic>
+        <p:nvPicPr>
+          <p:cNvPr id="3" name="Imagen 2" descr="Interfaz de usuario gráfica, Sitio web&#10;&#10;El contenido generado por IA puede ser incorrecto.">
+            <a:extLst>
+              <a:ext uri="{FF2B5EF4-FFF2-40B4-BE49-F238E27FC236}">
+                <a16:creationId xmlns:a16="http://schemas.microsoft.com/office/drawing/2014/main" id="{E42A9AD9-BC87-8028-757D-3EFD1290235C}"/>
+              </a:ext>
+            </a:extLst>
+          </p:cNvPr>
+          <p:cNvPicPr>
+            <a:picLocks noChangeAspect="1"/>
+          </p:cNvPicPr>
+          <p:nvPr/>
+        </p:nvPicPr>
+        <p:blipFill>
+          <a:blip r:embed="rId2"/>
+          <a:srcRect l="1408" t="74593" r="48368" b="635"/>
+          <a:stretch>
+            <a:fillRect/>
+          </a:stretch>
+        </p:blipFill>
+        <p:spPr>
+          <a:xfrm>
+            <a:off x="9162854" y="2578066"/>
+            <a:ext cx="2312191" cy="952506"/>
+          </a:xfrm>
+          <a:prstGeom prst="rect">
+            <a:avLst/>
+          </a:prstGeom>
+        </p:spPr>
+      </p:pic>
+      <p:pic>
+        <p:nvPicPr>
+          <p:cNvPr id="4" name="Imagen 3" descr="Interfaz de usuario gráfica, Sitio web&#10;&#10;El contenido generado por IA puede ser incorrecto.">
+            <a:extLst>
+              <a:ext uri="{FF2B5EF4-FFF2-40B4-BE49-F238E27FC236}">
+                <a16:creationId xmlns:a16="http://schemas.microsoft.com/office/drawing/2014/main" id="{48FD93C8-6D04-E57D-9D4D-86D008B7AE09}"/>
+              </a:ext>
+            </a:extLst>
+          </p:cNvPr>
+          <p:cNvPicPr>
+            <a:picLocks noChangeAspect="1"/>
+          </p:cNvPicPr>
+          <p:nvPr/>
+        </p:nvPicPr>
+        <p:blipFill>
+          <a:blip r:embed="rId2"/>
+          <a:srcRect l="53409" t="73172"/>
+          <a:stretch>
+            <a:fillRect/>
+          </a:stretch>
+        </p:blipFill>
+        <p:spPr>
+          <a:xfrm>
+            <a:off x="6596490" y="3531444"/>
+            <a:ext cx="2379343" cy="1144251"/>
+          </a:xfrm>
+          <a:prstGeom prst="rect">
+            <a:avLst/>
+          </a:prstGeom>
+        </p:spPr>
+      </p:pic>
+    </p:spTree>
+    <p:extLst>
+      <p:ext uri="{BB962C8B-B14F-4D97-AF65-F5344CB8AC3E}">
+        <p14:creationId xmlns:p14="http://schemas.microsoft.com/office/powerpoint/2010/main" val="1349964298"/>
+      </p:ext>
+    </p:extLst>
+  </p:cSld>
+  <p:clrMapOvr>
+    <a:masterClrMapping/>
+  </p:clrMapOvr>
+</p:sld>
+</file>
+
+<file path=ppt/slides/slide3.xml><?xml version="1.0" encoding="utf-8"?>
 <p:sld xmlns:a="http://schemas.openxmlformats.org/drawingml/2006/main" xmlns:r="http://schemas.openxmlformats.org/officeDocument/2006/relationships" xmlns:p="http://schemas.openxmlformats.org/presentationml/2006/main">
   <p:cSld>
     <p:spTree>

</xml_diff>

<commit_message>
QH: divide en Servicios y Actividades
</commit_message>
<xml_diff>
--- a/rediseño layout.pptx
+++ b/rediseño layout.pptx
@@ -8,6 +8,7 @@
     <p:sldId id="256" r:id="rId2"/>
     <p:sldId id="258" r:id="rId3"/>
     <p:sldId id="257" r:id="rId4"/>
+    <p:sldId id="259" r:id="rId5"/>
   </p:sldIdLst>
   <p:sldSz cx="12192000" cy="6858000"/>
   <p:notesSz cx="6858000" cy="9144000"/>
@@ -106,13 +107,18 @@
       </a:defRPr>
     </a:lvl9pPr>
   </p:defaultTextStyle>
+  <p:extLst>
+    <p:ext uri="{EFAFB233-063F-42B5-8137-9DF3F51BA10A}">
+      <p15:sldGuideLst xmlns:p15="http://schemas.microsoft.com/office/powerpoint/2012/main"/>
+    </p:ext>
+  </p:extLst>
 </p:presentation>
 </file>
 
 <file path=ppt/revisionInfo.xml><?xml version="1.0" encoding="utf-8"?>
 <p1510:revInfo xmlns:a="http://schemas.openxmlformats.org/drawingml/2006/main" xmlns:r="http://schemas.openxmlformats.org/officeDocument/2006/relationships" xmlns:p1510="http://schemas.microsoft.com/office/powerpoint/2015/10/main">
   <p1510:revLst>
-    <p1510:client id="{2799722A-FA85-4591-9325-11E350A8B82A}" v="3" dt="2026-02-20T08:16:32.488"/>
+    <p1510:client id="{2799722A-FA85-4591-9325-11E350A8B82A}" v="15" dt="2026-02-21T06:38:32.562"/>
   </p1510:revLst>
 </p1510:revInfo>
 </file>
@@ -122,10 +128,25 @@
   <pc:docChgLst>
     <pc:chgData name="Luis Guinea" userId="f040cd607ac8806d" providerId="LiveId" clId="{89890A16-D95C-48D1-8D5A-F39C0C2B1E7F}"/>
     <pc:docChg chg="custSel addSld modSld">
-      <pc:chgData name="Luis Guinea" userId="f040cd607ac8806d" providerId="LiveId" clId="{89890A16-D95C-48D1-8D5A-F39C0C2B1E7F}" dt="2026-02-20T08:16:53.859" v="27" actId="14100"/>
+      <pc:chgData name="Luis Guinea" userId="f040cd607ac8806d" providerId="LiveId" clId="{89890A16-D95C-48D1-8D5A-F39C0C2B1E7F}" dt="2026-02-21T06:38:40.106" v="178" actId="478"/>
       <pc:docMkLst>
         <pc:docMk/>
       </pc:docMkLst>
+      <pc:sldChg chg="modSp mod">
+        <pc:chgData name="Luis Guinea" userId="f040cd607ac8806d" providerId="LiveId" clId="{89890A16-D95C-48D1-8D5A-F39C0C2B1E7F}" dt="2026-02-21T06:34:16.999" v="94" actId="1076"/>
+        <pc:sldMkLst>
+          <pc:docMk/>
+          <pc:sldMk cId="369988677" sldId="256"/>
+        </pc:sldMkLst>
+        <pc:picChg chg="mod">
+          <ac:chgData name="Luis Guinea" userId="f040cd607ac8806d" providerId="LiveId" clId="{89890A16-D95C-48D1-8D5A-F39C0C2B1E7F}" dt="2026-02-21T06:34:16.999" v="94" actId="1076"/>
+          <ac:picMkLst>
+            <pc:docMk/>
+            <pc:sldMk cId="369988677" sldId="256"/>
+            <ac:picMk id="36" creationId="{B27A32E3-40F2-1B7F-F4F9-20C388645BD5}"/>
+          </ac:picMkLst>
+        </pc:picChg>
+      </pc:sldChg>
       <pc:sldChg chg="addSp delSp modSp add mod">
         <pc:chgData name="Luis Guinea" userId="f040cd607ac8806d" providerId="LiveId" clId="{89890A16-D95C-48D1-8D5A-F39C0C2B1E7F}" dt="2026-02-20T08:16:53.859" v="27" actId="14100"/>
         <pc:sldMkLst>
@@ -277,6 +298,181 @@
           </ac:picMkLst>
         </pc:picChg>
       </pc:sldChg>
+      <pc:sldChg chg="addSp delSp modSp new mod">
+        <pc:chgData name="Luis Guinea" userId="f040cd607ac8806d" providerId="LiveId" clId="{89890A16-D95C-48D1-8D5A-F39C0C2B1E7F}" dt="2026-02-21T06:38:40.106" v="178" actId="478"/>
+        <pc:sldMkLst>
+          <pc:docMk/>
+          <pc:sldMk cId="3503784063" sldId="259"/>
+        </pc:sldMkLst>
+        <pc:spChg chg="del">
+          <ac:chgData name="Luis Guinea" userId="f040cd607ac8806d" providerId="LiveId" clId="{89890A16-D95C-48D1-8D5A-F39C0C2B1E7F}" dt="2026-02-21T05:59:06.406" v="29" actId="478"/>
+          <ac:spMkLst>
+            <pc:docMk/>
+            <pc:sldMk cId="3503784063" sldId="259"/>
+            <ac:spMk id="2" creationId="{7CD81C76-A6A4-472B-E7BD-1A0F128041FC}"/>
+          </ac:spMkLst>
+        </pc:spChg>
+        <pc:spChg chg="del">
+          <ac:chgData name="Luis Guinea" userId="f040cd607ac8806d" providerId="LiveId" clId="{89890A16-D95C-48D1-8D5A-F39C0C2B1E7F}" dt="2026-02-21T05:59:10.276" v="30" actId="478"/>
+          <ac:spMkLst>
+            <pc:docMk/>
+            <pc:sldMk cId="3503784063" sldId="259"/>
+            <ac:spMk id="3" creationId="{6D29502C-1257-4B17-4D5A-955127CA90AA}"/>
+          </ac:spMkLst>
+        </pc:spChg>
+        <pc:spChg chg="add mod">
+          <ac:chgData name="Luis Guinea" userId="f040cd607ac8806d" providerId="LiveId" clId="{89890A16-D95C-48D1-8D5A-F39C0C2B1E7F}" dt="2026-02-21T06:06:12.304" v="67" actId="207"/>
+          <ac:spMkLst>
+            <pc:docMk/>
+            <pc:sldMk cId="3503784063" sldId="259"/>
+            <ac:spMk id="11" creationId="{120673D4-D1EB-AE2D-ED96-84ED4BB8CC85}"/>
+          </ac:spMkLst>
+        </pc:spChg>
+        <pc:spChg chg="add mod">
+          <ac:chgData name="Luis Guinea" userId="f040cd607ac8806d" providerId="LiveId" clId="{89890A16-D95C-48D1-8D5A-F39C0C2B1E7F}" dt="2026-02-21T06:36:59.676" v="150" actId="1076"/>
+          <ac:spMkLst>
+            <pc:docMk/>
+            <pc:sldMk cId="3503784063" sldId="259"/>
+            <ac:spMk id="16" creationId="{E17DAE72-C888-DBC6-B279-A0D5E241160F}"/>
+          </ac:spMkLst>
+        </pc:spChg>
+        <pc:spChg chg="add mod">
+          <ac:chgData name="Luis Guinea" userId="f040cd607ac8806d" providerId="LiveId" clId="{89890A16-D95C-48D1-8D5A-F39C0C2B1E7F}" dt="2026-02-21T06:35:41.179" v="132" actId="1076"/>
+          <ac:spMkLst>
+            <pc:docMk/>
+            <pc:sldMk cId="3503784063" sldId="259"/>
+            <ac:spMk id="17" creationId="{1F676A6D-5854-A901-76D3-D22191D6FC17}"/>
+          </ac:spMkLst>
+        </pc:spChg>
+        <pc:spChg chg="add mod">
+          <ac:chgData name="Luis Guinea" userId="f040cd607ac8806d" providerId="LiveId" clId="{89890A16-D95C-48D1-8D5A-F39C0C2B1E7F}" dt="2026-02-21T06:38:28.966" v="175" actId="1076"/>
+          <ac:spMkLst>
+            <pc:docMk/>
+            <pc:sldMk cId="3503784063" sldId="259"/>
+            <ac:spMk id="18" creationId="{45162485-985D-B7B2-CA7B-3BA6F70E02A6}"/>
+          </ac:spMkLst>
+        </pc:spChg>
+        <pc:spChg chg="add mod">
+          <ac:chgData name="Luis Guinea" userId="f040cd607ac8806d" providerId="LiveId" clId="{89890A16-D95C-48D1-8D5A-F39C0C2B1E7F}" dt="2026-02-21T06:37:49.649" v="162" actId="1076"/>
+          <ac:spMkLst>
+            <pc:docMk/>
+            <pc:sldMk cId="3503784063" sldId="259"/>
+            <ac:spMk id="19" creationId="{5135BB85-3E7C-01E2-8B60-49E35DC94805}"/>
+          </ac:spMkLst>
+        </pc:spChg>
+        <pc:spChg chg="add mod">
+          <ac:chgData name="Luis Guinea" userId="f040cd607ac8806d" providerId="LiveId" clId="{89890A16-D95C-48D1-8D5A-F39C0C2B1E7F}" dt="2026-02-21T06:38:35.909" v="177" actId="1076"/>
+          <ac:spMkLst>
+            <pc:docMk/>
+            <pc:sldMk cId="3503784063" sldId="259"/>
+            <ac:spMk id="23" creationId="{65B87BEF-DC61-43E7-02A4-F79936A8B4CD}"/>
+          </ac:spMkLst>
+        </pc:spChg>
+        <pc:picChg chg="add mod">
+          <ac:chgData name="Luis Guinea" userId="f040cd607ac8806d" providerId="LiveId" clId="{89890A16-D95C-48D1-8D5A-F39C0C2B1E7F}" dt="2026-02-21T05:59:20.957" v="35" actId="14100"/>
+          <ac:picMkLst>
+            <pc:docMk/>
+            <pc:sldMk cId="3503784063" sldId="259"/>
+            <ac:picMk id="5" creationId="{3042DDF9-DD82-346E-F6F2-CC673FE6275D}"/>
+          </ac:picMkLst>
+        </pc:picChg>
+        <pc:picChg chg="add mod">
+          <ac:chgData name="Luis Guinea" userId="f040cd607ac8806d" providerId="LiveId" clId="{89890A16-D95C-48D1-8D5A-F39C0C2B1E7F}" dt="2026-02-21T06:00:08.344" v="37" actId="1076"/>
+          <ac:picMkLst>
+            <pc:docMk/>
+            <pc:sldMk cId="3503784063" sldId="259"/>
+            <ac:picMk id="6" creationId="{BCCFD129-383E-8420-3EF9-7CE1CC24EE6A}"/>
+          </ac:picMkLst>
+        </pc:picChg>
+        <pc:picChg chg="add del mod modCrop">
+          <ac:chgData name="Luis Guinea" userId="f040cd607ac8806d" providerId="LiveId" clId="{89890A16-D95C-48D1-8D5A-F39C0C2B1E7F}" dt="2026-02-21T06:05:52.228" v="64" actId="478"/>
+          <ac:picMkLst>
+            <pc:docMk/>
+            <pc:sldMk cId="3503784063" sldId="259"/>
+            <ac:picMk id="7" creationId="{154732D3-A4DD-793A-A571-C5D98D6B524A}"/>
+          </ac:picMkLst>
+        </pc:picChg>
+        <pc:picChg chg="add del mod modCrop">
+          <ac:chgData name="Luis Guinea" userId="f040cd607ac8806d" providerId="LiveId" clId="{89890A16-D95C-48D1-8D5A-F39C0C2B1E7F}" dt="2026-02-21T06:05:58.264" v="65" actId="478"/>
+          <ac:picMkLst>
+            <pc:docMk/>
+            <pc:sldMk cId="3503784063" sldId="259"/>
+            <ac:picMk id="8" creationId="{C83D7337-5073-A3E1-5EEF-319CFC23DBF6}"/>
+          </ac:picMkLst>
+        </pc:picChg>
+        <pc:picChg chg="add mod modCrop">
+          <ac:chgData name="Luis Guinea" userId="f040cd607ac8806d" providerId="LiveId" clId="{89890A16-D95C-48D1-8D5A-F39C0C2B1E7F}" dt="2026-02-21T06:04:46.481" v="56" actId="1076"/>
+          <ac:picMkLst>
+            <pc:docMk/>
+            <pc:sldMk cId="3503784063" sldId="259"/>
+            <ac:picMk id="9" creationId="{EEFF92B0-1076-2CCA-3E92-0B3C85267A8E}"/>
+          </ac:picMkLst>
+        </pc:picChg>
+        <pc:picChg chg="add mod modCrop">
+          <ac:chgData name="Luis Guinea" userId="f040cd607ac8806d" providerId="LiveId" clId="{89890A16-D95C-48D1-8D5A-F39C0C2B1E7F}" dt="2026-02-21T06:05:38.990" v="63" actId="14100"/>
+          <ac:picMkLst>
+            <pc:docMk/>
+            <pc:sldMk cId="3503784063" sldId="259"/>
+            <ac:picMk id="10" creationId="{A7AD89C7-2771-EAAD-035F-C40C8DEB651C}"/>
+          </ac:picMkLst>
+        </pc:picChg>
+        <pc:picChg chg="add mod modCrop">
+          <ac:chgData name="Luis Guinea" userId="f040cd607ac8806d" providerId="LiveId" clId="{89890A16-D95C-48D1-8D5A-F39C0C2B1E7F}" dt="2026-02-21T06:30:05.371" v="72" actId="1076"/>
+          <ac:picMkLst>
+            <pc:docMk/>
+            <pc:sldMk cId="3503784063" sldId="259"/>
+            <ac:picMk id="12" creationId="{931344C3-B0FE-716E-9502-EBF1B2D25A4C}"/>
+          </ac:picMkLst>
+        </pc:picChg>
+        <pc:picChg chg="add del mod">
+          <ac:chgData name="Luis Guinea" userId="f040cd607ac8806d" providerId="LiveId" clId="{89890A16-D95C-48D1-8D5A-F39C0C2B1E7F}" dt="2026-02-21T06:36:04.675" v="133" actId="478"/>
+          <ac:picMkLst>
+            <pc:docMk/>
+            <pc:sldMk cId="3503784063" sldId="259"/>
+            <ac:picMk id="13" creationId="{250CACED-FF19-2F54-2E86-92049AA76ED1}"/>
+          </ac:picMkLst>
+        </pc:picChg>
+        <pc:picChg chg="add mod modCrop">
+          <ac:chgData name="Luis Guinea" userId="f040cd607ac8806d" providerId="LiveId" clId="{89890A16-D95C-48D1-8D5A-F39C0C2B1E7F}" dt="2026-02-21T06:32:41.822" v="85" actId="1076"/>
+          <ac:picMkLst>
+            <pc:docMk/>
+            <pc:sldMk cId="3503784063" sldId="259"/>
+            <ac:picMk id="14" creationId="{818BA569-E5FA-ED8B-6893-02690C718181}"/>
+          </ac:picMkLst>
+        </pc:picChg>
+        <pc:picChg chg="add mod modCrop">
+          <ac:chgData name="Luis Guinea" userId="f040cd607ac8806d" providerId="LiveId" clId="{89890A16-D95C-48D1-8D5A-F39C0C2B1E7F}" dt="2026-02-21T06:33:33.311" v="91" actId="14100"/>
+          <ac:picMkLst>
+            <pc:docMk/>
+            <pc:sldMk cId="3503784063" sldId="259"/>
+            <ac:picMk id="15" creationId="{C2D8C62D-13BA-EF29-DB1F-906DD47E35C1}"/>
+          </ac:picMkLst>
+        </pc:picChg>
+        <pc:picChg chg="add del mod">
+          <ac:chgData name="Luis Guinea" userId="f040cd607ac8806d" providerId="LiveId" clId="{89890A16-D95C-48D1-8D5A-F39C0C2B1E7F}" dt="2026-02-21T06:38:40.106" v="178" actId="478"/>
+          <ac:picMkLst>
+            <pc:docMk/>
+            <pc:sldMk cId="3503784063" sldId="259"/>
+            <ac:picMk id="20" creationId="{5EFCD190-7E45-BA80-FE35-5BDF30871EE5}"/>
+          </ac:picMkLst>
+        </pc:picChg>
+        <pc:picChg chg="add del mod">
+          <ac:chgData name="Luis Guinea" userId="f040cd607ac8806d" providerId="LiveId" clId="{89890A16-D95C-48D1-8D5A-F39C0C2B1E7F}" dt="2026-02-21T06:38:40.106" v="178" actId="478"/>
+          <ac:picMkLst>
+            <pc:docMk/>
+            <pc:sldMk cId="3503784063" sldId="259"/>
+            <ac:picMk id="21" creationId="{44D407BC-FF7A-6507-F233-295E623F6439}"/>
+          </ac:picMkLst>
+        </pc:picChg>
+        <pc:picChg chg="add del mod">
+          <ac:chgData name="Luis Guinea" userId="f040cd607ac8806d" providerId="LiveId" clId="{89890A16-D95C-48D1-8D5A-F39C0C2B1E7F}" dt="2026-02-21T06:38:40.106" v="178" actId="478"/>
+          <ac:picMkLst>
+            <pc:docMk/>
+            <pc:sldMk cId="3503784063" sldId="259"/>
+            <ac:picMk id="22" creationId="{339DB796-B742-E3E5-831C-6603011AD7A6}"/>
+          </ac:picMkLst>
+        </pc:picChg>
+      </pc:sldChg>
     </pc:docChg>
   </pc:docChgLst>
 </pc:chgInfo>
@@ -429,7 +625,7 @@
           <a:p>
             <a:fld id="{3B0330FD-ACC8-4F8B-9E7D-A9103019845D}" type="datetimeFigureOut">
               <a:rPr lang="es-ES" smtClean="0"/>
-              <a:t>20/02/2026</a:t>
+              <a:t>21/02/2026</a:t>
             </a:fld>
             <a:endParaRPr lang="es-ES"/>
           </a:p>
@@ -627,7 +823,7 @@
           <a:p>
             <a:fld id="{3B0330FD-ACC8-4F8B-9E7D-A9103019845D}" type="datetimeFigureOut">
               <a:rPr lang="es-ES" smtClean="0"/>
-              <a:t>20/02/2026</a:t>
+              <a:t>21/02/2026</a:t>
             </a:fld>
             <a:endParaRPr lang="es-ES"/>
           </a:p>
@@ -835,7 +1031,7 @@
           <a:p>
             <a:fld id="{3B0330FD-ACC8-4F8B-9E7D-A9103019845D}" type="datetimeFigureOut">
               <a:rPr lang="es-ES" smtClean="0"/>
-              <a:t>20/02/2026</a:t>
+              <a:t>21/02/2026</a:t>
             </a:fld>
             <a:endParaRPr lang="es-ES"/>
           </a:p>
@@ -1033,7 +1229,7 @@
           <a:p>
             <a:fld id="{3B0330FD-ACC8-4F8B-9E7D-A9103019845D}" type="datetimeFigureOut">
               <a:rPr lang="es-ES" smtClean="0"/>
-              <a:t>20/02/2026</a:t>
+              <a:t>21/02/2026</a:t>
             </a:fld>
             <a:endParaRPr lang="es-ES"/>
           </a:p>
@@ -1308,7 +1504,7 @@
           <a:p>
             <a:fld id="{3B0330FD-ACC8-4F8B-9E7D-A9103019845D}" type="datetimeFigureOut">
               <a:rPr lang="es-ES" smtClean="0"/>
-              <a:t>20/02/2026</a:t>
+              <a:t>21/02/2026</a:t>
             </a:fld>
             <a:endParaRPr lang="es-ES"/>
           </a:p>
@@ -1573,7 +1769,7 @@
           <a:p>
             <a:fld id="{3B0330FD-ACC8-4F8B-9E7D-A9103019845D}" type="datetimeFigureOut">
               <a:rPr lang="es-ES" smtClean="0"/>
-              <a:t>20/02/2026</a:t>
+              <a:t>21/02/2026</a:t>
             </a:fld>
             <a:endParaRPr lang="es-ES"/>
           </a:p>
@@ -1985,7 +2181,7 @@
           <a:p>
             <a:fld id="{3B0330FD-ACC8-4F8B-9E7D-A9103019845D}" type="datetimeFigureOut">
               <a:rPr lang="es-ES" smtClean="0"/>
-              <a:t>20/02/2026</a:t>
+              <a:t>21/02/2026</a:t>
             </a:fld>
             <a:endParaRPr lang="es-ES"/>
           </a:p>
@@ -2126,7 +2322,7 @@
           <a:p>
             <a:fld id="{3B0330FD-ACC8-4F8B-9E7D-A9103019845D}" type="datetimeFigureOut">
               <a:rPr lang="es-ES" smtClean="0"/>
-              <a:t>20/02/2026</a:t>
+              <a:t>21/02/2026</a:t>
             </a:fld>
             <a:endParaRPr lang="es-ES"/>
           </a:p>
@@ -2239,7 +2435,7 @@
           <a:p>
             <a:fld id="{3B0330FD-ACC8-4F8B-9E7D-A9103019845D}" type="datetimeFigureOut">
               <a:rPr lang="es-ES" smtClean="0"/>
-              <a:t>20/02/2026</a:t>
+              <a:t>21/02/2026</a:t>
             </a:fld>
             <a:endParaRPr lang="es-ES"/>
           </a:p>
@@ -2550,7 +2746,7 @@
           <a:p>
             <a:fld id="{3B0330FD-ACC8-4F8B-9E7D-A9103019845D}" type="datetimeFigureOut">
               <a:rPr lang="es-ES" smtClean="0"/>
-              <a:t>20/02/2026</a:t>
+              <a:t>21/02/2026</a:t>
             </a:fld>
             <a:endParaRPr lang="es-ES"/>
           </a:p>
@@ -2838,7 +3034,7 @@
           <a:p>
             <a:fld id="{3B0330FD-ACC8-4F8B-9E7D-A9103019845D}" type="datetimeFigureOut">
               <a:rPr lang="es-ES" smtClean="0"/>
-              <a:t>20/02/2026</a:t>
+              <a:t>21/02/2026</a:t>
             </a:fld>
             <a:endParaRPr lang="es-ES"/>
           </a:p>
@@ -3079,7 +3275,7 @@
           <a:p>
             <a:fld id="{3B0330FD-ACC8-4F8B-9E7D-A9103019845D}" type="datetimeFigureOut">
               <a:rPr lang="es-ES" smtClean="0"/>
-              <a:t>20/02/2026</a:t>
+              <a:t>21/02/2026</a:t>
             </a:fld>
             <a:endParaRPr lang="es-ES"/>
           </a:p>
@@ -4524,7 +4720,7 @@
         </p:blipFill>
         <p:spPr>
           <a:xfrm>
-            <a:off x="3111749" y="929423"/>
+            <a:off x="-138691" y="1359093"/>
             <a:ext cx="5968501" cy="4999153"/>
           </a:xfrm>
           <a:prstGeom prst="rect">
@@ -4888,6 +5084,703 @@
     <p:extLst>
       <p:ext uri="{BB962C8B-B14F-4D97-AF65-F5344CB8AC3E}">
         <p14:creationId xmlns:p14="http://schemas.microsoft.com/office/powerpoint/2010/main" val="2920264061"/>
+      </p:ext>
+    </p:extLst>
+  </p:cSld>
+  <p:clrMapOvr>
+    <a:masterClrMapping/>
+  </p:clrMapOvr>
+</p:sld>
+</file>
+
+<file path=ppt/slides/slide4.xml><?xml version="1.0" encoding="utf-8"?>
+<p:sld xmlns:a="http://schemas.openxmlformats.org/drawingml/2006/main" xmlns:r="http://schemas.openxmlformats.org/officeDocument/2006/relationships" xmlns:p="http://schemas.openxmlformats.org/presentationml/2006/main">
+  <p:cSld>
+    <p:spTree>
+      <p:nvGrpSpPr>
+        <p:cNvPr id="1" name=""/>
+        <p:cNvGrpSpPr/>
+        <p:nvPr/>
+      </p:nvGrpSpPr>
+      <p:grpSpPr>
+        <a:xfrm>
+          <a:off x="0" y="0"/>
+          <a:ext cx="0" cy="0"/>
+          <a:chOff x="0" y="0"/>
+          <a:chExt cx="0" cy="0"/>
+        </a:xfrm>
+      </p:grpSpPr>
+      <p:pic>
+        <p:nvPicPr>
+          <p:cNvPr id="5" name="Imagen 4" descr="Captura de pantalla de un celular&#10;&#10;El contenido generado por IA puede ser incorrecto.">
+            <a:extLst>
+              <a:ext uri="{FF2B5EF4-FFF2-40B4-BE49-F238E27FC236}">
+                <a16:creationId xmlns:a16="http://schemas.microsoft.com/office/drawing/2014/main" id="{3042DDF9-DD82-346E-F6F2-CC673FE6275D}"/>
+              </a:ext>
+            </a:extLst>
+          </p:cNvPr>
+          <p:cNvPicPr>
+            <a:picLocks noChangeAspect="1"/>
+          </p:cNvPicPr>
+          <p:nvPr/>
+        </p:nvPicPr>
+        <p:blipFill>
+          <a:blip r:embed="rId2"/>
+          <a:stretch>
+            <a:fillRect/>
+          </a:stretch>
+        </p:blipFill>
+        <p:spPr>
+          <a:xfrm>
+            <a:off x="3345579" y="920699"/>
+            <a:ext cx="6790659" cy="1851998"/>
+          </a:xfrm>
+          <a:prstGeom prst="rect">
+            <a:avLst/>
+          </a:prstGeom>
+        </p:spPr>
+      </p:pic>
+      <p:pic>
+        <p:nvPicPr>
+          <p:cNvPr id="6" name="Imagen 5" descr="Captura de pantalla de un celular&#10;&#10;El contenido generado por IA puede ser incorrecto.">
+            <a:extLst>
+              <a:ext uri="{FF2B5EF4-FFF2-40B4-BE49-F238E27FC236}">
+                <a16:creationId xmlns:a16="http://schemas.microsoft.com/office/drawing/2014/main" id="{BCCFD129-383E-8420-3EF9-7CE1CC24EE6A}"/>
+              </a:ext>
+            </a:extLst>
+          </p:cNvPr>
+          <p:cNvPicPr>
+            <a:picLocks noChangeAspect="1"/>
+          </p:cNvPicPr>
+          <p:nvPr/>
+        </p:nvPicPr>
+        <p:blipFill>
+          <a:blip r:embed="rId2"/>
+          <a:stretch>
+            <a:fillRect/>
+          </a:stretch>
+        </p:blipFill>
+        <p:spPr>
+          <a:xfrm>
+            <a:off x="3345579" y="4085304"/>
+            <a:ext cx="6790659" cy="1851998"/>
+          </a:xfrm>
+          <a:prstGeom prst="rect">
+            <a:avLst/>
+          </a:prstGeom>
+        </p:spPr>
+      </p:pic>
+      <p:pic>
+        <p:nvPicPr>
+          <p:cNvPr id="9" name="Imagen 8" descr="Captura de pantalla de un celular&#10;&#10;El contenido generado por IA puede ser incorrecto.">
+            <a:extLst>
+              <a:ext uri="{FF2B5EF4-FFF2-40B4-BE49-F238E27FC236}">
+                <a16:creationId xmlns:a16="http://schemas.microsoft.com/office/drawing/2014/main" id="{EEFF92B0-1076-2CCA-3E92-0B3C85267A8E}"/>
+              </a:ext>
+            </a:extLst>
+          </p:cNvPr>
+          <p:cNvPicPr>
+            <a:picLocks noChangeAspect="1"/>
+          </p:cNvPicPr>
+          <p:nvPr/>
+        </p:nvPicPr>
+        <p:blipFill>
+          <a:blip r:embed="rId2"/>
+          <a:srcRect l="1817" t="28155" r="49387"/>
+          <a:stretch>
+            <a:fillRect/>
+          </a:stretch>
+        </p:blipFill>
+        <p:spPr>
+          <a:xfrm>
+            <a:off x="6822670" y="4606726"/>
+            <a:ext cx="3313568" cy="1330575"/>
+          </a:xfrm>
+          <a:prstGeom prst="rect">
+            <a:avLst/>
+          </a:prstGeom>
+        </p:spPr>
+      </p:pic>
+      <p:pic>
+        <p:nvPicPr>
+          <p:cNvPr id="10" name="Imagen 9" descr="Captura de pantalla de un celular&#10;&#10;El contenido generado por IA puede ser incorrecto.">
+            <a:extLst>
+              <a:ext uri="{FF2B5EF4-FFF2-40B4-BE49-F238E27FC236}">
+                <a16:creationId xmlns:a16="http://schemas.microsoft.com/office/drawing/2014/main" id="{A7AD89C7-2771-EAAD-035F-C40C8DEB651C}"/>
+              </a:ext>
+            </a:extLst>
+          </p:cNvPr>
+          <p:cNvPicPr>
+            <a:picLocks noChangeAspect="1"/>
+          </p:cNvPicPr>
+          <p:nvPr/>
+        </p:nvPicPr>
+        <p:blipFill>
+          <a:blip r:embed="rId2"/>
+          <a:srcRect l="31548" r="51253" b="82860"/>
+          <a:stretch>
+            <a:fillRect/>
+          </a:stretch>
+        </p:blipFill>
+        <p:spPr>
+          <a:xfrm>
+            <a:off x="6707711" y="4085303"/>
+            <a:ext cx="3313567" cy="521422"/>
+          </a:xfrm>
+          <a:prstGeom prst="rect">
+            <a:avLst/>
+          </a:prstGeom>
+        </p:spPr>
+      </p:pic>
+      <p:sp>
+        <p:nvSpPr>
+          <p:cNvPr id="11" name="Flecha: hacia abajo 10">
+            <a:extLst>
+              <a:ext uri="{FF2B5EF4-FFF2-40B4-BE49-F238E27FC236}">
+                <a16:creationId xmlns:a16="http://schemas.microsoft.com/office/drawing/2014/main" id="{120673D4-D1EB-AE2D-ED96-84ED4BB8CC85}"/>
+              </a:ext>
+            </a:extLst>
+          </p:cNvPr>
+          <p:cNvSpPr/>
+          <p:nvPr/>
+        </p:nvSpPr>
+        <p:spPr>
+          <a:xfrm>
+            <a:off x="6364586" y="2869949"/>
+            <a:ext cx="715224" cy="1032095"/>
+          </a:xfrm>
+          <a:prstGeom prst="downArrow">
+            <a:avLst/>
+          </a:prstGeom>
+          <a:solidFill>
+            <a:srgbClr val="FF0000"/>
+          </a:solidFill>
+        </p:spPr>
+        <p:style>
+          <a:lnRef idx="2">
+            <a:schemeClr val="accent1">
+              <a:shade val="15000"/>
+            </a:schemeClr>
+          </a:lnRef>
+          <a:fillRef idx="1">
+            <a:schemeClr val="accent1"/>
+          </a:fillRef>
+          <a:effectRef idx="0">
+            <a:schemeClr val="accent1"/>
+          </a:effectRef>
+          <a:fontRef idx="minor">
+            <a:schemeClr val="lt1"/>
+          </a:fontRef>
+        </p:style>
+        <p:txBody>
+          <a:bodyPr rtlCol="0" anchor="ctr"/>
+          <a:lstStyle/>
+          <a:p>
+            <a:pPr algn="ctr"/>
+            <a:endParaRPr lang="es-ES"/>
+          </a:p>
+        </p:txBody>
+      </p:sp>
+      <p:pic>
+        <p:nvPicPr>
+          <p:cNvPr id="12" name="Imagen 11" descr="Captura de pantalla de un celular&#10;&#10;El contenido generado por IA puede ser incorrecto.">
+            <a:extLst>
+              <a:ext uri="{FF2B5EF4-FFF2-40B4-BE49-F238E27FC236}">
+                <a16:creationId xmlns:a16="http://schemas.microsoft.com/office/drawing/2014/main" id="{931344C3-B0FE-716E-9502-EBF1B2D25A4C}"/>
+              </a:ext>
+            </a:extLst>
+          </p:cNvPr>
+          <p:cNvPicPr>
+            <a:picLocks noChangeAspect="1"/>
+          </p:cNvPicPr>
+          <p:nvPr/>
+        </p:nvPicPr>
+        <p:blipFill>
+          <a:blip r:embed="rId2"/>
+          <a:srcRect l="52776" t="8803" r="34091" b="78097"/>
+          <a:stretch>
+            <a:fillRect/>
+          </a:stretch>
+        </p:blipFill>
+        <p:spPr>
+          <a:xfrm>
+            <a:off x="3435165" y="4110624"/>
+            <a:ext cx="865231" cy="235390"/>
+          </a:xfrm>
+          <a:prstGeom prst="rect">
+            <a:avLst/>
+          </a:prstGeom>
+        </p:spPr>
+      </p:pic>
+      <p:pic>
+        <p:nvPicPr>
+          <p:cNvPr id="14" name="Imagen 13">
+            <a:extLst>
+              <a:ext uri="{FF2B5EF4-FFF2-40B4-BE49-F238E27FC236}">
+                <a16:creationId xmlns:a16="http://schemas.microsoft.com/office/drawing/2014/main" id="{818BA569-E5FA-ED8B-6893-02690C718181}"/>
+              </a:ext>
+            </a:extLst>
+          </p:cNvPr>
+          <p:cNvPicPr>
+            <a:picLocks noChangeAspect="1"/>
+          </p:cNvPicPr>
+          <p:nvPr/>
+        </p:nvPicPr>
+        <p:blipFill>
+          <a:blip r:embed="rId3"/>
+          <a:srcRect l="2959" t="52994" r="72960" b="17190"/>
+          <a:stretch>
+            <a:fillRect/>
+          </a:stretch>
+        </p:blipFill>
+        <p:spPr>
+          <a:xfrm>
+            <a:off x="3549250" y="4718761"/>
+            <a:ext cx="1066917" cy="1106504"/>
+          </a:xfrm>
+          <a:prstGeom prst="rect">
+            <a:avLst/>
+          </a:prstGeom>
+        </p:spPr>
+      </p:pic>
+      <p:pic>
+        <p:nvPicPr>
+          <p:cNvPr id="15" name="Imagen 14">
+            <a:extLst>
+              <a:ext uri="{FF2B5EF4-FFF2-40B4-BE49-F238E27FC236}">
+                <a16:creationId xmlns:a16="http://schemas.microsoft.com/office/drawing/2014/main" id="{C2D8C62D-13BA-EF29-DB1F-906DD47E35C1}"/>
+              </a:ext>
+            </a:extLst>
+          </p:cNvPr>
+          <p:cNvPicPr>
+            <a:picLocks noChangeAspect="1"/>
+          </p:cNvPicPr>
+          <p:nvPr/>
+        </p:nvPicPr>
+        <p:blipFill>
+          <a:blip r:embed="rId3"/>
+          <a:srcRect l="65046" t="3372" r="3539" b="91166"/>
+          <a:stretch>
+            <a:fillRect/>
+          </a:stretch>
+        </p:blipFill>
+        <p:spPr>
+          <a:xfrm>
+            <a:off x="4616167" y="4718761"/>
+            <a:ext cx="1678794" cy="1021136"/>
+          </a:xfrm>
+          <a:prstGeom prst="rect">
+            <a:avLst/>
+          </a:prstGeom>
+        </p:spPr>
+      </p:pic>
+      <p:sp>
+        <p:nvSpPr>
+          <p:cNvPr id="16" name="CuadroTexto 15">
+            <a:extLst>
+              <a:ext uri="{FF2B5EF4-FFF2-40B4-BE49-F238E27FC236}">
+                <a16:creationId xmlns:a16="http://schemas.microsoft.com/office/drawing/2014/main" id="{E17DAE72-C888-DBC6-B279-A0D5E241160F}"/>
+              </a:ext>
+            </a:extLst>
+          </p:cNvPr>
+          <p:cNvSpPr txBox="1"/>
+          <p:nvPr/>
+        </p:nvSpPr>
+        <p:spPr>
+          <a:xfrm>
+            <a:off x="6876890" y="4719733"/>
+            <a:ext cx="2587293" cy="215444"/>
+          </a:xfrm>
+          <a:prstGeom prst="rect">
+            <a:avLst/>
+          </a:prstGeom>
+          <a:solidFill>
+            <a:srgbClr val="081544"/>
+          </a:solidFill>
+        </p:spPr>
+        <p:txBody>
+          <a:bodyPr wrap="square" rtlCol="0">
+            <a:spAutoFit/>
+          </a:bodyPr>
+          <a:lstStyle/>
+          <a:p>
+            <a:r>
+              <a:rPr lang="es-ES" sz="800" b="1" dirty="0">
+                <a:solidFill>
+                  <a:schemeClr val="bg1">
+                    <a:lumMod val="95000"/>
+                  </a:schemeClr>
+                </a:solidFill>
+                <a:latin typeface="Arial Black" panose="020B0A04020102020204" pitchFamily="34" charset="0"/>
+              </a:rPr>
+              <a:t>Actividades</a:t>
+            </a:r>
+          </a:p>
+        </p:txBody>
+      </p:sp>
+      <p:sp>
+        <p:nvSpPr>
+          <p:cNvPr id="17" name="CuadroTexto 16">
+            <a:extLst>
+              <a:ext uri="{FF2B5EF4-FFF2-40B4-BE49-F238E27FC236}">
+                <a16:creationId xmlns:a16="http://schemas.microsoft.com/office/drawing/2014/main" id="{1F676A6D-5854-A901-76D3-D22191D6FC17}"/>
+              </a:ext>
+            </a:extLst>
+          </p:cNvPr>
+          <p:cNvSpPr txBox="1"/>
+          <p:nvPr/>
+        </p:nvSpPr>
+        <p:spPr>
+          <a:xfrm>
+            <a:off x="3689880" y="4959344"/>
+            <a:ext cx="1737616" cy="836571"/>
+          </a:xfrm>
+          <a:prstGeom prst="rect">
+            <a:avLst/>
+          </a:prstGeom>
+          <a:solidFill>
+            <a:srgbClr val="081544"/>
+          </a:solidFill>
+        </p:spPr>
+        <p:txBody>
+          <a:bodyPr wrap="square" lIns="396000" tIns="36000" rtlCol="0">
+            <a:spAutoFit/>
+          </a:bodyPr>
+          <a:lstStyle/>
+          <a:p>
+            <a:r>
+              <a:rPr lang="es-ES" sz="700" dirty="0">
+                <a:solidFill>
+                  <a:schemeClr val="bg1">
+                    <a:lumMod val="95000"/>
+                  </a:schemeClr>
+                </a:solidFill>
+                <a:latin typeface="Arial" panose="020B0604020202020204" pitchFamily="34" charset="0"/>
+                <a:cs typeface="Arial" panose="020B0604020202020204" pitchFamily="34" charset="0"/>
+              </a:rPr>
+              <a:t>Tramitaciones</a:t>
+            </a:r>
+            <a:endParaRPr lang="es-ES" sz="500" dirty="0">
+              <a:solidFill>
+                <a:schemeClr val="bg1">
+                  <a:lumMod val="95000"/>
+                </a:schemeClr>
+              </a:solidFill>
+              <a:latin typeface="Arial" panose="020B0604020202020204" pitchFamily="34" charset="0"/>
+              <a:cs typeface="Arial" panose="020B0604020202020204" pitchFamily="34" charset="0"/>
+            </a:endParaRPr>
+          </a:p>
+          <a:p>
+            <a:pPr marL="171450" indent="-171450">
+              <a:buFontTx/>
+              <a:buChar char="-"/>
+            </a:pPr>
+            <a:endParaRPr lang="es-ES" sz="700" dirty="0">
+              <a:solidFill>
+                <a:schemeClr val="bg1">
+                  <a:lumMod val="95000"/>
+                </a:schemeClr>
+              </a:solidFill>
+              <a:latin typeface="Arial" panose="020B0604020202020204" pitchFamily="34" charset="0"/>
+              <a:cs typeface="Arial" panose="020B0604020202020204" pitchFamily="34" charset="0"/>
+            </a:endParaRPr>
+          </a:p>
+          <a:p>
+            <a:r>
+              <a:rPr lang="es-ES" sz="700" dirty="0">
+                <a:solidFill>
+                  <a:schemeClr val="bg1">
+                    <a:lumMod val="95000"/>
+                  </a:schemeClr>
+                </a:solidFill>
+                <a:latin typeface="Arial" panose="020B0604020202020204" pitchFamily="34" charset="0"/>
+                <a:cs typeface="Arial" panose="020B0604020202020204" pitchFamily="34" charset="0"/>
+              </a:rPr>
+              <a:t>Riesgos Laborales</a:t>
+            </a:r>
+            <a:endParaRPr lang="es-ES" sz="500" dirty="0">
+              <a:solidFill>
+                <a:schemeClr val="bg1">
+                  <a:lumMod val="95000"/>
+                </a:schemeClr>
+              </a:solidFill>
+              <a:latin typeface="Arial" panose="020B0604020202020204" pitchFamily="34" charset="0"/>
+              <a:cs typeface="Arial" panose="020B0604020202020204" pitchFamily="34" charset="0"/>
+            </a:endParaRPr>
+          </a:p>
+          <a:p>
+            <a:endParaRPr lang="es-ES" sz="700" dirty="0">
+              <a:solidFill>
+                <a:schemeClr val="bg1">
+                  <a:lumMod val="95000"/>
+                </a:schemeClr>
+              </a:solidFill>
+              <a:latin typeface="Arial" panose="020B0604020202020204" pitchFamily="34" charset="0"/>
+              <a:cs typeface="Arial" panose="020B0604020202020204" pitchFamily="34" charset="0"/>
+            </a:endParaRPr>
+          </a:p>
+          <a:p>
+            <a:r>
+              <a:rPr lang="es-ES" sz="700" dirty="0">
+                <a:solidFill>
+                  <a:schemeClr val="bg1">
+                    <a:lumMod val="95000"/>
+                  </a:schemeClr>
+                </a:solidFill>
+                <a:latin typeface="Arial" panose="020B0604020202020204" pitchFamily="34" charset="0"/>
+                <a:cs typeface="Arial" panose="020B0604020202020204" pitchFamily="34" charset="0"/>
+              </a:rPr>
+              <a:t>Presencia</a:t>
+            </a:r>
+            <a:endParaRPr lang="es-ES" sz="500" dirty="0">
+              <a:solidFill>
+                <a:schemeClr val="bg1">
+                  <a:lumMod val="95000"/>
+                </a:schemeClr>
+              </a:solidFill>
+              <a:latin typeface="Arial" panose="020B0604020202020204" pitchFamily="34" charset="0"/>
+              <a:cs typeface="Arial" panose="020B0604020202020204" pitchFamily="34" charset="0"/>
+            </a:endParaRPr>
+          </a:p>
+          <a:p>
+            <a:endParaRPr lang="es-ES" sz="700" dirty="0">
+              <a:solidFill>
+                <a:schemeClr val="bg1">
+                  <a:lumMod val="95000"/>
+                </a:schemeClr>
+              </a:solidFill>
+              <a:latin typeface="Arial" panose="020B0604020202020204" pitchFamily="34" charset="0"/>
+              <a:cs typeface="Arial" panose="020B0604020202020204" pitchFamily="34" charset="0"/>
+            </a:endParaRPr>
+          </a:p>
+          <a:p>
+            <a:r>
+              <a:rPr lang="es-ES" sz="700" dirty="0">
+                <a:solidFill>
+                  <a:schemeClr val="bg1">
+                    <a:lumMod val="95000"/>
+                  </a:schemeClr>
+                </a:solidFill>
+                <a:latin typeface="Arial" panose="020B0604020202020204" pitchFamily="34" charset="0"/>
+                <a:cs typeface="Arial" panose="020B0604020202020204" pitchFamily="34" charset="0"/>
+              </a:rPr>
+              <a:t>Tienda Online</a:t>
+            </a:r>
+            <a:endParaRPr lang="es-ES" sz="500" dirty="0">
+              <a:solidFill>
+                <a:schemeClr val="bg1">
+                  <a:lumMod val="95000"/>
+                </a:schemeClr>
+              </a:solidFill>
+              <a:latin typeface="Arial" panose="020B0604020202020204" pitchFamily="34" charset="0"/>
+              <a:cs typeface="Arial" panose="020B0604020202020204" pitchFamily="34" charset="0"/>
+            </a:endParaRPr>
+          </a:p>
+        </p:txBody>
+      </p:sp>
+      <p:sp>
+        <p:nvSpPr>
+          <p:cNvPr id="18" name="CuadroTexto 17">
+            <a:extLst>
+              <a:ext uri="{FF2B5EF4-FFF2-40B4-BE49-F238E27FC236}">
+                <a16:creationId xmlns:a16="http://schemas.microsoft.com/office/drawing/2014/main" id="{45162485-985D-B7B2-CA7B-3BA6F70E02A6}"/>
+              </a:ext>
+            </a:extLst>
+          </p:cNvPr>
+          <p:cNvSpPr txBox="1"/>
+          <p:nvPr/>
+        </p:nvSpPr>
+        <p:spPr>
+          <a:xfrm>
+            <a:off x="8763047" y="4810445"/>
+            <a:ext cx="1037163" cy="475478"/>
+          </a:xfrm>
+          <a:prstGeom prst="rect">
+            <a:avLst/>
+          </a:prstGeom>
+          <a:solidFill>
+            <a:srgbClr val="081544"/>
+          </a:solidFill>
+        </p:spPr>
+        <p:txBody>
+          <a:bodyPr wrap="square" tIns="180000" bIns="108000" rtlCol="0">
+            <a:spAutoFit/>
+          </a:bodyPr>
+          <a:lstStyle/>
+          <a:p>
+            <a:endParaRPr lang="es-ES" sz="1200" b="1" dirty="0">
+              <a:solidFill>
+                <a:schemeClr val="bg1">
+                  <a:lumMod val="95000"/>
+                </a:schemeClr>
+              </a:solidFill>
+              <a:latin typeface="Arial Black" panose="020B0A04020102020204" pitchFamily="34" charset="0"/>
+            </a:endParaRPr>
+          </a:p>
+        </p:txBody>
+      </p:sp>
+      <p:sp>
+        <p:nvSpPr>
+          <p:cNvPr id="19" name="CuadroTexto 18">
+            <a:extLst>
+              <a:ext uri="{FF2B5EF4-FFF2-40B4-BE49-F238E27FC236}">
+                <a16:creationId xmlns:a16="http://schemas.microsoft.com/office/drawing/2014/main" id="{5135BB85-3E7C-01E2-8B60-49E35DC94805}"/>
+              </a:ext>
+            </a:extLst>
+          </p:cNvPr>
+          <p:cNvSpPr txBox="1"/>
+          <p:nvPr/>
+        </p:nvSpPr>
+        <p:spPr>
+          <a:xfrm>
+            <a:off x="6875982" y="4935177"/>
+            <a:ext cx="1905019" cy="836571"/>
+          </a:xfrm>
+          <a:prstGeom prst="rect">
+            <a:avLst/>
+          </a:prstGeom>
+          <a:solidFill>
+            <a:srgbClr val="081544"/>
+          </a:solidFill>
+        </p:spPr>
+        <p:txBody>
+          <a:bodyPr wrap="square" tIns="36000" rtlCol="0">
+            <a:spAutoFit/>
+          </a:bodyPr>
+          <a:lstStyle/>
+          <a:p>
+            <a:r>
+              <a:rPr lang="es-ES" sz="700" dirty="0">
+                <a:solidFill>
+                  <a:schemeClr val="bg1">
+                    <a:lumMod val="95000"/>
+                  </a:schemeClr>
+                </a:solidFill>
+                <a:latin typeface="Arial" panose="020B0604020202020204" pitchFamily="34" charset="0"/>
+                <a:cs typeface="Arial" panose="020B0604020202020204" pitchFamily="34" charset="0"/>
+              </a:rPr>
+              <a:t>Campaña tarjeta comercio</a:t>
+            </a:r>
+          </a:p>
+          <a:p>
+            <a:endParaRPr lang="es-ES" sz="700" dirty="0">
+              <a:solidFill>
+                <a:schemeClr val="bg1">
+                  <a:lumMod val="95000"/>
+                </a:schemeClr>
+              </a:solidFill>
+              <a:latin typeface="Arial" panose="020B0604020202020204" pitchFamily="34" charset="0"/>
+              <a:cs typeface="Arial" panose="020B0604020202020204" pitchFamily="34" charset="0"/>
+            </a:endParaRPr>
+          </a:p>
+          <a:p>
+            <a:endParaRPr lang="es-ES" sz="700" dirty="0">
+              <a:solidFill>
+                <a:schemeClr val="bg1">
+                  <a:lumMod val="95000"/>
+                </a:schemeClr>
+              </a:solidFill>
+              <a:latin typeface="Arial" panose="020B0604020202020204" pitchFamily="34" charset="0"/>
+              <a:cs typeface="Arial" panose="020B0604020202020204" pitchFamily="34" charset="0"/>
+            </a:endParaRPr>
+          </a:p>
+          <a:p>
+            <a:r>
+              <a:rPr lang="es-ES" sz="700" dirty="0">
+                <a:solidFill>
+                  <a:schemeClr val="bg1">
+                    <a:lumMod val="95000"/>
+                  </a:schemeClr>
+                </a:solidFill>
+                <a:latin typeface="Arial" panose="020B0604020202020204" pitchFamily="34" charset="0"/>
+                <a:cs typeface="Arial" panose="020B0604020202020204" pitchFamily="34" charset="0"/>
+              </a:rPr>
+              <a:t>Degustación gastronómica</a:t>
+            </a:r>
+          </a:p>
+          <a:p>
+            <a:endParaRPr lang="es-ES" sz="700" dirty="0">
+              <a:solidFill>
+                <a:schemeClr val="bg1">
+                  <a:lumMod val="95000"/>
+                </a:schemeClr>
+              </a:solidFill>
+              <a:latin typeface="Arial" panose="020B0604020202020204" pitchFamily="34" charset="0"/>
+              <a:cs typeface="Arial" panose="020B0604020202020204" pitchFamily="34" charset="0"/>
+            </a:endParaRPr>
+          </a:p>
+          <a:p>
+            <a:endParaRPr lang="es-ES" sz="700" dirty="0">
+              <a:solidFill>
+                <a:schemeClr val="bg1">
+                  <a:lumMod val="95000"/>
+                </a:schemeClr>
+              </a:solidFill>
+              <a:latin typeface="Arial" panose="020B0604020202020204" pitchFamily="34" charset="0"/>
+              <a:cs typeface="Arial" panose="020B0604020202020204" pitchFamily="34" charset="0"/>
+            </a:endParaRPr>
+          </a:p>
+          <a:p>
+            <a:r>
+              <a:rPr lang="es-ES" sz="700" dirty="0">
+                <a:solidFill>
+                  <a:schemeClr val="bg1">
+                    <a:lumMod val="95000"/>
+                  </a:schemeClr>
+                </a:solidFill>
+                <a:latin typeface="Arial" panose="020B0604020202020204" pitchFamily="34" charset="0"/>
+                <a:cs typeface="Arial" panose="020B0604020202020204" pitchFamily="34" charset="0"/>
+              </a:rPr>
+              <a:t>Sorteos</a:t>
+            </a:r>
+          </a:p>
+        </p:txBody>
+      </p:sp>
+      <p:sp>
+        <p:nvSpPr>
+          <p:cNvPr id="23" name="CuadroTexto 22">
+            <a:extLst>
+              <a:ext uri="{FF2B5EF4-FFF2-40B4-BE49-F238E27FC236}">
+                <a16:creationId xmlns:a16="http://schemas.microsoft.com/office/drawing/2014/main" id="{65B87BEF-DC61-43E7-02A4-F79936A8B4CD}"/>
+              </a:ext>
+            </a:extLst>
+          </p:cNvPr>
+          <p:cNvSpPr txBox="1"/>
+          <p:nvPr/>
+        </p:nvSpPr>
+        <p:spPr>
+          <a:xfrm>
+            <a:off x="8781001" y="5159899"/>
+            <a:ext cx="1037163" cy="475478"/>
+          </a:xfrm>
+          <a:prstGeom prst="rect">
+            <a:avLst/>
+          </a:prstGeom>
+          <a:solidFill>
+            <a:srgbClr val="081544"/>
+          </a:solidFill>
+        </p:spPr>
+        <p:txBody>
+          <a:bodyPr wrap="square" tIns="180000" bIns="108000" rtlCol="0">
+            <a:spAutoFit/>
+          </a:bodyPr>
+          <a:lstStyle/>
+          <a:p>
+            <a:endParaRPr lang="es-ES" sz="1200" b="1" dirty="0">
+              <a:solidFill>
+                <a:schemeClr val="bg1">
+                  <a:lumMod val="95000"/>
+                </a:schemeClr>
+              </a:solidFill>
+              <a:latin typeface="Arial Black" panose="020B0A04020102020204" pitchFamily="34" charset="0"/>
+            </a:endParaRPr>
+          </a:p>
+        </p:txBody>
+      </p:sp>
+    </p:spTree>
+    <p:extLst>
+      <p:ext uri="{BB962C8B-B14F-4D97-AF65-F5344CB8AC3E}">
+        <p14:creationId xmlns:p14="http://schemas.microsoft.com/office/powerpoint/2010/main" val="3503784063"/>
       </p:ext>
     </p:extLst>
   </p:cSld>

</xml_diff>